<commit_message>
Fixed animations for "Abstract Classes and Interfaces"
</commit_message>
<xml_diff>
--- a/Courses/Software-Sciences/Module-1-OOP-New/11-Abstract-Classes-and-Interfaces/11-Abstract-Classes-and-Interfaces.pptx
+++ b/Courses/Software-Sciences/Module-1-OOP-New/11-Abstract-Classes-and-Interfaces/11-Abstract-Classes-and-Interfaces.pptx
@@ -317,7 +317,7 @@
           <a:p>
             <a:fld id="{4E087215-0C8F-4762-A664-737A353EC9A4}" type="datetimeFigureOut">
               <a:rPr lang="bg-BG" smtClean="0"/>
-              <a:t>14.12.22 г.</a:t>
+              <a:t>21.12.22 г.</a:t>
             </a:fld>
             <a:endParaRPr lang="bg-BG"/>
           </a:p>
@@ -508,7 +508,7 @@
           <a:p>
             <a:fld id="{72D84649-876A-46C9-8472-14CB09C070D8}" type="datetimeFigureOut">
               <a:rPr lang="en-US" smtClean="0"/>
-              <a:t>12/14/22</a:t>
+              <a:t>12/21/22</a:t>
             </a:fld>
             <a:endParaRPr lang="en-US"/>
           </a:p>
@@ -20035,7 +20035,12 @@
             <p:ph type="body" sz="quarter" idx="10"/>
           </p:nvPr>
         </p:nvSpPr>
-        <p:spPr/>
+        <p:spPr>
+          <a:xfrm>
+            <a:off x="176270" y="937179"/>
+            <a:ext cx="11818096" cy="5528766"/>
+          </a:xfrm>
+        </p:spPr>
         <p:txBody>
           <a:bodyPr/>
           <a:lstStyle/>
@@ -20138,7 +20143,7 @@
         </p:nvSpPr>
         <p:spPr bwMode="auto">
           <a:xfrm>
-            <a:off x="621958" y="3204001"/>
+            <a:off x="621958" y="2682249"/>
             <a:ext cx="3674875" cy="1658447"/>
           </a:xfrm>
           <a:prstGeom prst="rect">
@@ -20248,7 +20253,7 @@
         </p:nvSpPr>
         <p:spPr bwMode="auto">
           <a:xfrm>
-            <a:off x="4431000" y="3204000"/>
+            <a:off x="4431000" y="2682248"/>
             <a:ext cx="6869875" cy="1658447"/>
           </a:xfrm>
           <a:prstGeom prst="rect">
@@ -20396,7 +20401,7 @@
         </p:nvSpPr>
         <p:spPr bwMode="auto">
           <a:xfrm>
-            <a:off x="621958" y="5004000"/>
+            <a:off x="612591" y="4624122"/>
             <a:ext cx="7904042" cy="1658447"/>
           </a:xfrm>
           <a:prstGeom prst="rect">
@@ -20489,7 +20494,7 @@
         </p:nvSpPr>
         <p:spPr bwMode="auto">
           <a:xfrm>
-            <a:off x="8908700" y="5004001"/>
+            <a:off x="8899333" y="4624123"/>
             <a:ext cx="2902300" cy="1531708"/>
           </a:xfrm>
           <a:prstGeom prst="wedgeRoundRectCallout">
@@ -20598,7 +20603,7 @@
         </p:nvSpPr>
         <p:spPr bwMode="auto">
           <a:xfrm>
-            <a:off x="5351400" y="4885820"/>
+            <a:off x="5342033" y="4505942"/>
             <a:ext cx="1170000" cy="1035001"/>
           </a:xfrm>
           <a:prstGeom prst="mathMultiply">
@@ -22117,21 +22122,88 @@
                                   </p:childTnLst>
                                 </p:cTn>
                               </p:par>
+                            </p:childTnLst>
+                          </p:cTn>
+                        </p:par>
+                      </p:childTnLst>
+                    </p:cTn>
+                  </p:par>
+                  <p:par>
+                    <p:cTn id="7" fill="hold">
+                      <p:stCondLst>
+                        <p:cond delay="indefinite"/>
+                      </p:stCondLst>
+                      <p:childTnLst>
+                        <p:par>
+                          <p:cTn id="8" fill="hold">
+                            <p:stCondLst>
+                              <p:cond delay="0"/>
+                            </p:stCondLst>
+                            <p:childTnLst>
                               <p:par>
-                                <p:cTn id="7" presetID="1" presetClass="entr" presetSubtype="0" fill="hold" nodeType="withEffect">
+                                <p:cTn id="9" presetID="1" presetClass="entr" presetSubtype="0" fill="hold" nodeType="clickEffect">
                                   <p:stCondLst>
                                     <p:cond delay="0"/>
                                   </p:stCondLst>
                                   <p:childTnLst>
                                     <p:set>
                                       <p:cBhvr>
-                                        <p:cTn id="8" dur="1" fill="hold">
+                                        <p:cTn id="10" dur="1" fill="hold">
                                           <p:stCondLst>
                                             <p:cond delay="0"/>
                                           </p:stCondLst>
                                         </p:cTn>
                                         <p:tgtEl>
                                           <p:spTgt spid="7">
+                                            <p:txEl>
+                                              <p:pRg st="2" end="2"/>
+                                            </p:txEl>
+                                          </p:spTgt>
+                                        </p:tgtEl>
+                                        <p:attrNameLst>
+                                          <p:attrName>style.visibility</p:attrName>
+                                        </p:attrNameLst>
+                                      </p:cBhvr>
+                                      <p:to>
+                                        <p:strVal val="visible"/>
+                                      </p:to>
+                                    </p:set>
+                                  </p:childTnLst>
+                                </p:cTn>
+                              </p:par>
+                            </p:childTnLst>
+                          </p:cTn>
+                        </p:par>
+                      </p:childTnLst>
+                    </p:cTn>
+                  </p:par>
+                  <p:par>
+                    <p:cTn id="11" fill="hold">
+                      <p:stCondLst>
+                        <p:cond delay="indefinite"/>
+                      </p:stCondLst>
+                      <p:childTnLst>
+                        <p:par>
+                          <p:cTn id="12" fill="hold">
+                            <p:stCondLst>
+                              <p:cond delay="0"/>
+                            </p:stCondLst>
+                            <p:childTnLst>
+                              <p:par>
+                                <p:cTn id="13" presetID="1" presetClass="entr" presetSubtype="0" fill="hold" nodeType="clickEffect">
+                                  <p:stCondLst>
+                                    <p:cond delay="0"/>
+                                  </p:stCondLst>
+                                  <p:childTnLst>
+                                    <p:set>
+                                      <p:cBhvr>
+                                        <p:cTn id="14" dur="1" fill="hold">
+                                          <p:stCondLst>
+                                            <p:cond delay="0"/>
+                                          </p:stCondLst>
+                                        </p:cTn>
+                                        <p:tgtEl>
+                                          <p:spTgt spid="6">
                                             <p:txEl>
                                               <p:pRg st="3" end="3"/>
                                             </p:txEl>
@@ -22155,32 +22227,32 @@
                     </p:cTn>
                   </p:par>
                   <p:par>
-                    <p:cTn id="9" fill="hold">
+                    <p:cTn id="15" fill="hold">
                       <p:stCondLst>
                         <p:cond delay="indefinite"/>
                       </p:stCondLst>
                       <p:childTnLst>
                         <p:par>
-                          <p:cTn id="10" fill="hold">
+                          <p:cTn id="16" fill="hold">
                             <p:stCondLst>
                               <p:cond delay="0"/>
                             </p:stCondLst>
                             <p:childTnLst>
                               <p:par>
-                                <p:cTn id="11" presetID="1" presetClass="entr" presetSubtype="0" fill="hold" nodeType="clickEffect">
+                                <p:cTn id="17" presetID="1" presetClass="entr" presetSubtype="0" fill="hold" nodeType="clickEffect">
                                   <p:stCondLst>
                                     <p:cond delay="0"/>
                                   </p:stCondLst>
                                   <p:childTnLst>
                                     <p:set>
                                       <p:cBhvr>
-                                        <p:cTn id="12" dur="1" fill="hold">
+                                        <p:cTn id="18" dur="1" fill="hold">
                                           <p:stCondLst>
                                             <p:cond delay="0"/>
                                           </p:stCondLst>
                                         </p:cTn>
                                         <p:tgtEl>
-                                          <p:spTgt spid="6">
+                                          <p:spTgt spid="7">
                                             <p:txEl>
                                               <p:pRg st="3" end="3"/>
                                             </p:txEl>
@@ -22691,37 +22763,6 @@
                                   </p:childTnLst>
                                 </p:cTn>
                               </p:par>
-                              <p:par>
-                                <p:cTn id="7" presetID="1" presetClass="entr" presetSubtype="0" fill="hold" nodeType="withEffect">
-                                  <p:stCondLst>
-                                    <p:cond delay="0"/>
-                                  </p:stCondLst>
-                                  <p:childTnLst>
-                                    <p:set>
-                                      <p:cBhvr>
-                                        <p:cTn id="8" dur="1" fill="hold">
-                                          <p:stCondLst>
-                                            <p:cond delay="0"/>
-                                          </p:stCondLst>
-                                        </p:cTn>
-                                        <p:tgtEl>
-                                          <p:spTgt spid="7">
-                                            <p:txEl>
-                                              <p:pRg st="2" end="2"/>
-                                            </p:txEl>
-                                          </p:spTgt>
-                                        </p:tgtEl>
-                                        <p:attrNameLst>
-                                          <p:attrName>style.visibility</p:attrName>
-                                        </p:attrNameLst>
-                                      </p:cBhvr>
-                                      <p:to>
-                                        <p:strVal val="visible"/>
-                                      </p:to>
-                                    </p:set>
-                                  </p:childTnLst>
-                                </p:cTn>
-                              </p:par>
                             </p:childTnLst>
                           </p:cTn>
                         </p:par>
@@ -22729,81 +22770,26 @@
                     </p:cTn>
                   </p:par>
                   <p:par>
-                    <p:cTn id="9" fill="hold">
+                    <p:cTn id="7" fill="hold">
                       <p:stCondLst>
                         <p:cond delay="indefinite"/>
-                        <p:cond evt="onBegin" delay="0">
-                          <p:tn val="2"/>
-                        </p:cond>
                       </p:stCondLst>
                       <p:childTnLst>
                         <p:par>
-                          <p:cTn id="10" fill="hold">
+                          <p:cTn id="8" fill="hold">
                             <p:stCondLst>
                               <p:cond delay="0"/>
                             </p:stCondLst>
                             <p:childTnLst>
                               <p:par>
-                                <p:cTn id="11" presetID="1" presetClass="entr" presetSubtype="0" fill="hold" nodeType="withEffect">
+                                <p:cTn id="9" presetID="1" presetClass="entr" presetSubtype="0" fill="hold" nodeType="clickEffect">
                                   <p:stCondLst>
                                     <p:cond delay="0"/>
                                   </p:stCondLst>
                                   <p:childTnLst>
                                     <p:set>
                                       <p:cBhvr>
-                                        <p:cTn id="12" dur="1" fill="hold">
-                                          <p:stCondLst>
-                                            <p:cond delay="0"/>
-                                          </p:stCondLst>
-                                        </p:cTn>
-                                        <p:tgtEl>
-                                          <p:spTgt spid="7">
-                                            <p:txEl>
-                                              <p:pRg st="2" end="2"/>
-                                            </p:txEl>
-                                          </p:spTgt>
-                                        </p:tgtEl>
-                                        <p:attrNameLst>
-                                          <p:attrName>style.visibility</p:attrName>
-                                        </p:attrNameLst>
-                                      </p:cBhvr>
-                                      <p:to>
-                                        <p:strVal val="visible"/>
-                                      </p:to>
-                                    </p:set>
-                                  </p:childTnLst>
-                                </p:cTn>
-                              </p:par>
-                            </p:childTnLst>
-                          </p:cTn>
-                        </p:par>
-                      </p:childTnLst>
-                    </p:cTn>
-                  </p:par>
-                  <p:par>
-                    <p:cTn id="13" fill="hold">
-                      <p:stCondLst>
-                        <p:cond delay="indefinite"/>
-                        <p:cond evt="onBegin" delay="0">
-                          <p:tn val="2"/>
-                        </p:cond>
-                      </p:stCondLst>
-                      <p:childTnLst>
-                        <p:par>
-                          <p:cTn id="14" fill="hold">
-                            <p:stCondLst>
-                              <p:cond delay="0"/>
-                            </p:stCondLst>
-                            <p:childTnLst>
-                              <p:par>
-                                <p:cTn id="15" presetID="1" presetClass="entr" presetSubtype="0" fill="hold" nodeType="withEffect">
-                                  <p:stCondLst>
-                                    <p:cond delay="0"/>
-                                  </p:stCondLst>
-                                  <p:childTnLst>
-                                    <p:set>
-                                      <p:cBhvr>
-                                        <p:cTn id="16" dur="1" fill="hold">
+                                        <p:cTn id="10" dur="1" fill="hold">
                                           <p:stCondLst>
                                             <p:cond delay="0"/>
                                           </p:stCondLst>
@@ -29582,78 +29568,6 @@
                                           </p:stCondLst>
                                         </p:cTn>
                                         <p:tgtEl>
-                                          <p:spTgt spid="5"/>
-                                        </p:tgtEl>
-                                        <p:attrNameLst>
-                                          <p:attrName>style.visibility</p:attrName>
-                                        </p:attrNameLst>
-                                      </p:cBhvr>
-                                      <p:to>
-                                        <p:strVal val="visible"/>
-                                      </p:to>
-                                    </p:set>
-                                  </p:childTnLst>
-                                </p:cTn>
-                              </p:par>
-                              <p:par>
-                                <p:cTn id="7" presetID="1" presetClass="entr" presetSubtype="0" fill="hold" grpId="0" nodeType="withEffect">
-                                  <p:stCondLst>
-                                    <p:cond delay="0"/>
-                                  </p:stCondLst>
-                                  <p:childTnLst>
-                                    <p:set>
-                                      <p:cBhvr>
-                                        <p:cTn id="8" dur="1" fill="hold">
-                                          <p:stCondLst>
-                                            <p:cond delay="0"/>
-                                          </p:stCondLst>
-                                        </p:cTn>
-                                        <p:tgtEl>
-                                          <p:spTgt spid="13"/>
-                                        </p:tgtEl>
-                                        <p:attrNameLst>
-                                          <p:attrName>style.visibility</p:attrName>
-                                        </p:attrNameLst>
-                                      </p:cBhvr>
-                                      <p:to>
-                                        <p:strVal val="visible"/>
-                                      </p:to>
-                                    </p:set>
-                                  </p:childTnLst>
-                                </p:cTn>
-                              </p:par>
-                            </p:childTnLst>
-                          </p:cTn>
-                        </p:par>
-                      </p:childTnLst>
-                    </p:cTn>
-                  </p:par>
-                  <p:par>
-                    <p:cTn id="9" fill="hold">
-                      <p:stCondLst>
-                        <p:cond delay="indefinite"/>
-                      </p:stCondLst>
-                      <p:childTnLst>
-                        <p:par>
-                          <p:cTn id="10" fill="hold">
-                            <p:stCondLst>
-                              <p:cond delay="0"/>
-                            </p:stCondLst>
-                            <p:childTnLst>
-                              <p:par>
-                                <p:cTn id="11" presetID="1" presetClass="entr" presetSubtype="0" fill="hold" nodeType="clickEffect">
-                                  <p:stCondLst>
-                                    <p:cond delay="0"/>
-                                  </p:stCondLst>
-                                  <p:childTnLst>
-                                    <p:set>
-                                      <p:cBhvr>
-                                        <p:cTn id="12" dur="1" fill="hold">
-                                          <p:stCondLst>
-                                            <p:cond delay="0"/>
-                                          </p:stCondLst>
-                                        </p:cTn>
-                                        <p:tgtEl>
                                           <p:spTgt spid="12">
                                             <p:txEl>
                                               <p:pRg st="1" end="1"/>
@@ -29678,19 +29592,95 @@
                     </p:cTn>
                   </p:par>
                   <p:par>
-                    <p:cTn id="13" fill="hold">
+                    <p:cTn id="7" fill="hold">
                       <p:stCondLst>
                         <p:cond delay="indefinite"/>
                       </p:stCondLst>
                       <p:childTnLst>
                         <p:par>
-                          <p:cTn id="14" fill="hold">
+                          <p:cTn id="8" fill="hold">
                             <p:stCondLst>
                               <p:cond delay="0"/>
                             </p:stCondLst>
                             <p:childTnLst>
                               <p:par>
-                                <p:cTn id="15" presetID="1" presetClass="entr" presetSubtype="0" fill="hold" nodeType="clickEffect">
+                                <p:cTn id="9" presetID="1" presetClass="entr" presetSubtype="0" fill="hold" nodeType="clickEffect">
+                                  <p:stCondLst>
+                                    <p:cond delay="0"/>
+                                  </p:stCondLst>
+                                  <p:childTnLst>
+                                    <p:set>
+                                      <p:cBhvr>
+                                        <p:cTn id="10" dur="1" fill="hold">
+                                          <p:stCondLst>
+                                            <p:cond delay="0"/>
+                                          </p:stCondLst>
+                                        </p:cTn>
+                                        <p:tgtEl>
+                                          <p:spTgt spid="12">
+                                            <p:txEl>
+                                              <p:pRg st="2" end="2"/>
+                                            </p:txEl>
+                                          </p:spTgt>
+                                        </p:tgtEl>
+                                        <p:attrNameLst>
+                                          <p:attrName>style.visibility</p:attrName>
+                                        </p:attrNameLst>
+                                      </p:cBhvr>
+                                      <p:to>
+                                        <p:strVal val="visible"/>
+                                      </p:to>
+                                    </p:set>
+                                  </p:childTnLst>
+                                </p:cTn>
+                              </p:par>
+                            </p:childTnLst>
+                          </p:cTn>
+                        </p:par>
+                      </p:childTnLst>
+                    </p:cTn>
+                  </p:par>
+                  <p:par>
+                    <p:cTn id="11" fill="hold">
+                      <p:stCondLst>
+                        <p:cond delay="indefinite"/>
+                      </p:stCondLst>
+                      <p:childTnLst>
+                        <p:par>
+                          <p:cTn id="12" fill="hold">
+                            <p:stCondLst>
+                              <p:cond delay="0"/>
+                            </p:stCondLst>
+                            <p:childTnLst>
+                              <p:par>
+                                <p:cTn id="13" presetID="1" presetClass="entr" presetSubtype="0" fill="hold" nodeType="clickEffect">
+                                  <p:stCondLst>
+                                    <p:cond delay="0"/>
+                                  </p:stCondLst>
+                                  <p:childTnLst>
+                                    <p:set>
+                                      <p:cBhvr>
+                                        <p:cTn id="14" dur="1" fill="hold">
+                                          <p:stCondLst>
+                                            <p:cond delay="0"/>
+                                          </p:stCondLst>
+                                        </p:cTn>
+                                        <p:tgtEl>
+                                          <p:spTgt spid="5"/>
+                                        </p:tgtEl>
+                                        <p:attrNameLst>
+                                          <p:attrName>style.visibility</p:attrName>
+                                        </p:attrNameLst>
+                                      </p:cBhvr>
+                                      <p:to>
+                                        <p:strVal val="visible"/>
+                                      </p:to>
+                                    </p:set>
+                                  </p:childTnLst>
+                                </p:cTn>
+                              </p:par>
+                              <p:par>
+                                <p:cTn id="15" presetID="1" presetClass="entr" presetSubtype="0" fill="hold" grpId="0" nodeType="withEffect">
                                   <p:stCondLst>
                                     <p:cond delay="0"/>
                                   </p:stCondLst>
@@ -29703,11 +29693,7 @@
                                           </p:stCondLst>
                                         </p:cTn>
                                         <p:tgtEl>
-                                          <p:spTgt spid="12">
-                                            <p:txEl>
-                                              <p:pRg st="2" end="2"/>
-                                            </p:txEl>
-                                          </p:spTgt>
+                                          <p:spTgt spid="13"/>
                                         </p:tgtEl>
                                         <p:attrNameLst>
                                           <p:attrName>style.visibility</p:attrName>
@@ -32148,8 +32134,8 @@
         </p:nvSpPr>
         <p:spPr bwMode="auto">
           <a:xfrm>
-            <a:off x="7671000" y="3885603"/>
-            <a:ext cx="3150000" cy="636150"/>
+            <a:off x="7671000" y="3744000"/>
+            <a:ext cx="3150000" cy="777753"/>
           </a:xfrm>
           <a:prstGeom prst="wedgeRoundRectCallout">
             <a:avLst>
@@ -32204,11 +32190,25 @@
                   <a:srgbClr val="FFFFFF"/>
                 </a:solidFill>
               </a:rPr>
-              <a:t>Един или повече интерфейси</a:t>
+              <a:t>Един или повече </a:t>
+            </a:r>
+            <a:r>
+              <a:rPr lang="bg-BG" sz="2400" b="1" dirty="0">
+                <a:solidFill>
+                  <a:schemeClr val="bg1">
+                    <a:lumMod val="60000"/>
+                    <a:lumOff val="40000"/>
+                  </a:schemeClr>
+                </a:solidFill>
+              </a:rPr>
+              <a:t>интерфейси</a:t>
             </a:r>
             <a:endParaRPr lang="en-US" sz="2400" b="1" dirty="0">
               <a:solidFill>
-                <a:srgbClr val="FFFFFF"/>
+                <a:schemeClr val="bg1">
+                  <a:lumMod val="60000"/>
+                  <a:lumOff val="40000"/>
+                </a:schemeClr>
               </a:solidFill>
             </a:endParaRPr>
           </a:p>
@@ -32224,8 +32224,8 @@
         </p:nvSpPr>
         <p:spPr bwMode="auto">
           <a:xfrm>
-            <a:off x="3463254" y="3854678"/>
-            <a:ext cx="3487746" cy="667074"/>
+            <a:off x="3463254" y="3743999"/>
+            <a:ext cx="3487746" cy="777753"/>
           </a:xfrm>
           <a:prstGeom prst="wedgeRoundRectCallout">
             <a:avLst>
@@ -32280,11 +32280,25 @@
                   <a:srgbClr val="FFFFFF"/>
                 </a:solidFill>
               </a:rPr>
-              <a:t>Класовете се изписват първи</a:t>
+              <a:t>Класовете се изписват </a:t>
+            </a:r>
+            <a:r>
+              <a:rPr lang="bg-BG" sz="2400" b="1" dirty="0">
+                <a:solidFill>
+                  <a:schemeClr val="bg1">
+                    <a:lumMod val="60000"/>
+                    <a:lumOff val="40000"/>
+                  </a:schemeClr>
+                </a:solidFill>
+              </a:rPr>
+              <a:t>първи</a:t>
             </a:r>
             <a:endParaRPr lang="en-US" sz="2400" b="1" dirty="0">
               <a:solidFill>
-                <a:srgbClr val="FFFFFF"/>
+                <a:schemeClr val="bg1">
+                  <a:lumMod val="60000"/>
+                  <a:lumOff val="40000"/>
+                </a:schemeClr>
               </a:solidFill>
             </a:endParaRPr>
           </a:p>

</xml_diff>

<commit_message>
Updated metadata for "11. Abstract Classes and Interfaces"
</commit_message>
<xml_diff>
--- a/Courses/Software-Sciences/Module-1-OOP-New/11-Abstract-Classes-and-Interfaces/11-Abstract-Classes-and-Interfaces.pptx
+++ b/Courses/Software-Sciences/Module-1-OOP-New/11-Abstract-Classes-and-Interfaces/11-Abstract-Classes-and-Interfaces.pptx
@@ -317,7 +317,7 @@
           <a:p>
             <a:fld id="{4E087215-0C8F-4762-A664-737A353EC9A4}" type="datetimeFigureOut">
               <a:rPr lang="bg-BG" smtClean="0"/>
-              <a:t>21.12.22 г.</a:t>
+              <a:t>18.01.23 г.</a:t>
             </a:fld>
             <a:endParaRPr lang="bg-BG"/>
           </a:p>
@@ -508,7 +508,7 @@
           <a:p>
             <a:fld id="{72D84649-876A-46C9-8472-14CB09C070D8}" type="datetimeFigureOut">
               <a:rPr lang="en-US" smtClean="0"/>
-              <a:t>12/21/22</a:t>
+              <a:t>1/18/23</a:t>
             </a:fld>
             <a:endParaRPr lang="en-US"/>
           </a:p>

</xml_diff>